<commit_message>
Tweak CRCS vs DRCS explanations
</commit_message>
<xml_diff>
--- a/diagrams/revisionControl/drcsVsCrcs/crcsDiagram.pptx
+++ b/diagrams/revisionControl/drcsVsCrcs/crcsDiagram.pptx
@@ -104,6 +104,22 @@
       </a:defRPr>
     </a:lvl9pPr>
   </p:defaultTextStyle>
+  <p:extLst>
+    <p:ext uri="{EFAFB233-063F-42B5-8137-9DF3F51BA10A}">
+      <p15:sldGuideLst xmlns:p15="http://schemas.microsoft.com/office/powerpoint/2012/main">
+        <p15:guide id="1" orient="horz" pos="2160">
+          <p15:clr>
+            <a:srgbClr val="A4A3A4"/>
+          </p15:clr>
+        </p15:guide>
+        <p15:guide id="2" pos="2880">
+          <p15:clr>
+            <a:srgbClr val="A4A3A4"/>
+          </p15:clr>
+        </p15:guide>
+      </p15:sldGuideLst>
+    </p:ext>
+  </p:extLst>
 </p:presentation>
 </file>
 
@@ -145,7 +161,7 @@
           <a:lstStyle/>
           <a:p>
             <a:r>
-              <a:rPr lang="en-US" smtClean="0"/>
+              <a:rPr lang="en-US"/>
               <a:t>Click to edit Master title style</a:t>
             </a:r>
             <a:endParaRPr lang="en-SG"/>
@@ -264,7 +280,7 @@
           </a:lstStyle>
           <a:p>
             <a:r>
-              <a:rPr lang="en-US" smtClean="0"/>
+              <a:rPr lang="en-US"/>
               <a:t>Click to edit Master subtitle style</a:t>
             </a:r>
             <a:endParaRPr lang="en-SG"/>
@@ -288,7 +304,7 @@
           <a:p>
             <a:fld id="{A8886CD7-4058-4E48-B9C4-9EA782D336AA}" type="datetimeFigureOut">
               <a:rPr lang="en-SG" smtClean="0"/>
-              <a:t>14/7/2017</a:t>
+              <a:t>29/7/2024</a:t>
             </a:fld>
             <a:endParaRPr lang="en-SG"/>
           </a:p>
@@ -382,7 +398,7 @@
           <a:lstStyle/>
           <a:p>
             <a:r>
-              <a:rPr lang="en-US" smtClean="0"/>
+              <a:rPr lang="en-US"/>
               <a:t>Click to edit Master title style</a:t>
             </a:r>
             <a:endParaRPr lang="en-SG"/>
@@ -406,35 +422,35 @@
           <a:p>
             <a:pPr lvl="0"/>
             <a:r>
-              <a:rPr lang="en-US" smtClean="0"/>
+              <a:rPr lang="en-US"/>
               <a:t>Click to edit Master text styles</a:t>
             </a:r>
           </a:p>
           <a:p>
             <a:pPr lvl="1"/>
             <a:r>
-              <a:rPr lang="en-US" smtClean="0"/>
+              <a:rPr lang="en-US"/>
               <a:t>Second level</a:t>
             </a:r>
           </a:p>
           <a:p>
             <a:pPr lvl="2"/>
             <a:r>
-              <a:rPr lang="en-US" smtClean="0"/>
+              <a:rPr lang="en-US"/>
               <a:t>Third level</a:t>
             </a:r>
           </a:p>
           <a:p>
             <a:pPr lvl="3"/>
             <a:r>
-              <a:rPr lang="en-US" smtClean="0"/>
+              <a:rPr lang="en-US"/>
               <a:t>Fourth level</a:t>
             </a:r>
           </a:p>
           <a:p>
             <a:pPr lvl="4"/>
             <a:r>
-              <a:rPr lang="en-US" smtClean="0"/>
+              <a:rPr lang="en-US"/>
               <a:t>Fifth level</a:t>
             </a:r>
             <a:endParaRPr lang="en-SG"/>
@@ -458,7 +474,7 @@
           <a:p>
             <a:fld id="{A8886CD7-4058-4E48-B9C4-9EA782D336AA}" type="datetimeFigureOut">
               <a:rPr lang="en-SG" smtClean="0"/>
-              <a:t>14/7/2017</a:t>
+              <a:t>29/7/2024</a:t>
             </a:fld>
             <a:endParaRPr lang="en-SG"/>
           </a:p>
@@ -557,7 +573,7 @@
           <a:lstStyle/>
           <a:p>
             <a:r>
-              <a:rPr lang="en-US" smtClean="0"/>
+              <a:rPr lang="en-US"/>
               <a:t>Click to edit Master title style</a:t>
             </a:r>
             <a:endParaRPr lang="en-SG"/>
@@ -586,35 +602,35 @@
           <a:p>
             <a:pPr lvl="0"/>
             <a:r>
-              <a:rPr lang="en-US" smtClean="0"/>
+              <a:rPr lang="en-US"/>
               <a:t>Click to edit Master text styles</a:t>
             </a:r>
           </a:p>
           <a:p>
             <a:pPr lvl="1"/>
             <a:r>
-              <a:rPr lang="en-US" smtClean="0"/>
+              <a:rPr lang="en-US"/>
               <a:t>Second level</a:t>
             </a:r>
           </a:p>
           <a:p>
             <a:pPr lvl="2"/>
             <a:r>
-              <a:rPr lang="en-US" smtClean="0"/>
+              <a:rPr lang="en-US"/>
               <a:t>Third level</a:t>
             </a:r>
           </a:p>
           <a:p>
             <a:pPr lvl="3"/>
             <a:r>
-              <a:rPr lang="en-US" smtClean="0"/>
+              <a:rPr lang="en-US"/>
               <a:t>Fourth level</a:t>
             </a:r>
           </a:p>
           <a:p>
             <a:pPr lvl="4"/>
             <a:r>
-              <a:rPr lang="en-US" smtClean="0"/>
+              <a:rPr lang="en-US"/>
               <a:t>Fifth level</a:t>
             </a:r>
             <a:endParaRPr lang="en-SG"/>
@@ -638,7 +654,7 @@
           <a:p>
             <a:fld id="{A8886CD7-4058-4E48-B9C4-9EA782D336AA}" type="datetimeFigureOut">
               <a:rPr lang="en-SG" smtClean="0"/>
-              <a:t>14/7/2017</a:t>
+              <a:t>29/7/2024</a:t>
             </a:fld>
             <a:endParaRPr lang="en-SG"/>
           </a:p>
@@ -732,7 +748,7 @@
           <a:lstStyle/>
           <a:p>
             <a:r>
-              <a:rPr lang="en-US" smtClean="0"/>
+              <a:rPr lang="en-US"/>
               <a:t>Click to edit Master title style</a:t>
             </a:r>
             <a:endParaRPr lang="en-SG"/>
@@ -756,35 +772,35 @@
           <a:p>
             <a:pPr lvl="0"/>
             <a:r>
-              <a:rPr lang="en-US" smtClean="0"/>
+              <a:rPr lang="en-US"/>
               <a:t>Click to edit Master text styles</a:t>
             </a:r>
           </a:p>
           <a:p>
             <a:pPr lvl="1"/>
             <a:r>
-              <a:rPr lang="en-US" smtClean="0"/>
+              <a:rPr lang="en-US"/>
               <a:t>Second level</a:t>
             </a:r>
           </a:p>
           <a:p>
             <a:pPr lvl="2"/>
             <a:r>
-              <a:rPr lang="en-US" smtClean="0"/>
+              <a:rPr lang="en-US"/>
               <a:t>Third level</a:t>
             </a:r>
           </a:p>
           <a:p>
             <a:pPr lvl="3"/>
             <a:r>
-              <a:rPr lang="en-US" smtClean="0"/>
+              <a:rPr lang="en-US"/>
               <a:t>Fourth level</a:t>
             </a:r>
           </a:p>
           <a:p>
             <a:pPr lvl="4"/>
             <a:r>
-              <a:rPr lang="en-US" smtClean="0"/>
+              <a:rPr lang="en-US"/>
               <a:t>Fifth level</a:t>
             </a:r>
             <a:endParaRPr lang="en-SG"/>
@@ -808,7 +824,7 @@
           <a:p>
             <a:fld id="{A8886CD7-4058-4E48-B9C4-9EA782D336AA}" type="datetimeFigureOut">
               <a:rPr lang="en-SG" smtClean="0"/>
-              <a:t>14/7/2017</a:t>
+              <a:t>29/7/2024</a:t>
             </a:fld>
             <a:endParaRPr lang="en-SG"/>
           </a:p>
@@ -911,7 +927,7 @@
           </a:lstStyle>
           <a:p>
             <a:r>
-              <a:rPr lang="en-US" smtClean="0"/>
+              <a:rPr lang="en-US"/>
               <a:t>Click to edit Master title style</a:t>
             </a:r>
             <a:endParaRPr lang="en-SG"/>
@@ -1031,7 +1047,7 @@
           <a:p>
             <a:pPr lvl="0"/>
             <a:r>
-              <a:rPr lang="en-US" smtClean="0"/>
+              <a:rPr lang="en-US"/>
               <a:t>Click to edit Master text styles</a:t>
             </a:r>
           </a:p>
@@ -1054,7 +1070,7 @@
           <a:p>
             <a:fld id="{A8886CD7-4058-4E48-B9C4-9EA782D336AA}" type="datetimeFigureOut">
               <a:rPr lang="en-SG" smtClean="0"/>
-              <a:t>14/7/2017</a:t>
+              <a:t>29/7/2024</a:t>
             </a:fld>
             <a:endParaRPr lang="en-SG"/>
           </a:p>
@@ -1148,7 +1164,7 @@
           <a:lstStyle/>
           <a:p>
             <a:r>
-              <a:rPr lang="en-US" smtClean="0"/>
+              <a:rPr lang="en-US"/>
               <a:t>Click to edit Master title style</a:t>
             </a:r>
             <a:endParaRPr lang="en-SG"/>
@@ -1205,35 +1221,35 @@
           <a:p>
             <a:pPr lvl="0"/>
             <a:r>
-              <a:rPr lang="en-US" smtClean="0"/>
+              <a:rPr lang="en-US"/>
               <a:t>Click to edit Master text styles</a:t>
             </a:r>
           </a:p>
           <a:p>
             <a:pPr lvl="1"/>
             <a:r>
-              <a:rPr lang="en-US" smtClean="0"/>
+              <a:rPr lang="en-US"/>
               <a:t>Second level</a:t>
             </a:r>
           </a:p>
           <a:p>
             <a:pPr lvl="2"/>
             <a:r>
-              <a:rPr lang="en-US" smtClean="0"/>
+              <a:rPr lang="en-US"/>
               <a:t>Third level</a:t>
             </a:r>
           </a:p>
           <a:p>
             <a:pPr lvl="3"/>
             <a:r>
-              <a:rPr lang="en-US" smtClean="0"/>
+              <a:rPr lang="en-US"/>
               <a:t>Fourth level</a:t>
             </a:r>
           </a:p>
           <a:p>
             <a:pPr lvl="4"/>
             <a:r>
-              <a:rPr lang="en-US" smtClean="0"/>
+              <a:rPr lang="en-US"/>
               <a:t>Fifth level</a:t>
             </a:r>
             <a:endParaRPr lang="en-SG"/>
@@ -1290,35 +1306,35 @@
           <a:p>
             <a:pPr lvl="0"/>
             <a:r>
-              <a:rPr lang="en-US" smtClean="0"/>
+              <a:rPr lang="en-US"/>
               <a:t>Click to edit Master text styles</a:t>
             </a:r>
           </a:p>
           <a:p>
             <a:pPr lvl="1"/>
             <a:r>
-              <a:rPr lang="en-US" smtClean="0"/>
+              <a:rPr lang="en-US"/>
               <a:t>Second level</a:t>
             </a:r>
           </a:p>
           <a:p>
             <a:pPr lvl="2"/>
             <a:r>
-              <a:rPr lang="en-US" smtClean="0"/>
+              <a:rPr lang="en-US"/>
               <a:t>Third level</a:t>
             </a:r>
           </a:p>
           <a:p>
             <a:pPr lvl="3"/>
             <a:r>
-              <a:rPr lang="en-US" smtClean="0"/>
+              <a:rPr lang="en-US"/>
               <a:t>Fourth level</a:t>
             </a:r>
           </a:p>
           <a:p>
             <a:pPr lvl="4"/>
             <a:r>
-              <a:rPr lang="en-US" smtClean="0"/>
+              <a:rPr lang="en-US"/>
               <a:t>Fifth level</a:t>
             </a:r>
             <a:endParaRPr lang="en-SG"/>
@@ -1342,7 +1358,7 @@
           <a:p>
             <a:fld id="{A8886CD7-4058-4E48-B9C4-9EA782D336AA}" type="datetimeFigureOut">
               <a:rPr lang="en-SG" smtClean="0"/>
-              <a:t>14/7/2017</a:t>
+              <a:t>29/7/2024</a:t>
             </a:fld>
             <a:endParaRPr lang="en-SG"/>
           </a:p>
@@ -1440,7 +1456,7 @@
           </a:lstStyle>
           <a:p>
             <a:r>
-              <a:rPr lang="en-US" smtClean="0"/>
+              <a:rPr lang="en-US"/>
               <a:t>Click to edit Master title style</a:t>
             </a:r>
             <a:endParaRPr lang="en-SG"/>
@@ -1506,7 +1522,7 @@
           <a:p>
             <a:pPr lvl="0"/>
             <a:r>
-              <a:rPr lang="en-US" smtClean="0"/>
+              <a:rPr lang="en-US"/>
               <a:t>Click to edit Master text styles</a:t>
             </a:r>
           </a:p>
@@ -1562,35 +1578,35 @@
           <a:p>
             <a:pPr lvl="0"/>
             <a:r>
-              <a:rPr lang="en-US" smtClean="0"/>
+              <a:rPr lang="en-US"/>
               <a:t>Click to edit Master text styles</a:t>
             </a:r>
           </a:p>
           <a:p>
             <a:pPr lvl="1"/>
             <a:r>
-              <a:rPr lang="en-US" smtClean="0"/>
+              <a:rPr lang="en-US"/>
               <a:t>Second level</a:t>
             </a:r>
           </a:p>
           <a:p>
             <a:pPr lvl="2"/>
             <a:r>
-              <a:rPr lang="en-US" smtClean="0"/>
+              <a:rPr lang="en-US"/>
               <a:t>Third level</a:t>
             </a:r>
           </a:p>
           <a:p>
             <a:pPr lvl="3"/>
             <a:r>
-              <a:rPr lang="en-US" smtClean="0"/>
+              <a:rPr lang="en-US"/>
               <a:t>Fourth level</a:t>
             </a:r>
           </a:p>
           <a:p>
             <a:pPr lvl="4"/>
             <a:r>
-              <a:rPr lang="en-US" smtClean="0"/>
+              <a:rPr lang="en-US"/>
               <a:t>Fifth level</a:t>
             </a:r>
             <a:endParaRPr lang="en-SG"/>
@@ -1656,7 +1672,7 @@
           <a:p>
             <a:pPr lvl="0"/>
             <a:r>
-              <a:rPr lang="en-US" smtClean="0"/>
+              <a:rPr lang="en-US"/>
               <a:t>Click to edit Master text styles</a:t>
             </a:r>
           </a:p>
@@ -1712,35 +1728,35 @@
           <a:p>
             <a:pPr lvl="0"/>
             <a:r>
-              <a:rPr lang="en-US" smtClean="0"/>
+              <a:rPr lang="en-US"/>
               <a:t>Click to edit Master text styles</a:t>
             </a:r>
           </a:p>
           <a:p>
             <a:pPr lvl="1"/>
             <a:r>
-              <a:rPr lang="en-US" smtClean="0"/>
+              <a:rPr lang="en-US"/>
               <a:t>Second level</a:t>
             </a:r>
           </a:p>
           <a:p>
             <a:pPr lvl="2"/>
             <a:r>
-              <a:rPr lang="en-US" smtClean="0"/>
+              <a:rPr lang="en-US"/>
               <a:t>Third level</a:t>
             </a:r>
           </a:p>
           <a:p>
             <a:pPr lvl="3"/>
             <a:r>
-              <a:rPr lang="en-US" smtClean="0"/>
+              <a:rPr lang="en-US"/>
               <a:t>Fourth level</a:t>
             </a:r>
           </a:p>
           <a:p>
             <a:pPr lvl="4"/>
             <a:r>
-              <a:rPr lang="en-US" smtClean="0"/>
+              <a:rPr lang="en-US"/>
               <a:t>Fifth level</a:t>
             </a:r>
             <a:endParaRPr lang="en-SG"/>
@@ -1764,7 +1780,7 @@
           <a:p>
             <a:fld id="{A8886CD7-4058-4E48-B9C4-9EA782D336AA}" type="datetimeFigureOut">
               <a:rPr lang="en-SG" smtClean="0"/>
-              <a:t>14/7/2017</a:t>
+              <a:t>29/7/2024</a:t>
             </a:fld>
             <a:endParaRPr lang="en-SG"/>
           </a:p>
@@ -1858,7 +1874,7 @@
           <a:lstStyle/>
           <a:p>
             <a:r>
-              <a:rPr lang="en-US" smtClean="0"/>
+              <a:rPr lang="en-US"/>
               <a:t>Click to edit Master title style</a:t>
             </a:r>
             <a:endParaRPr lang="en-SG"/>
@@ -1882,7 +1898,7 @@
           <a:p>
             <a:fld id="{A8886CD7-4058-4E48-B9C4-9EA782D336AA}" type="datetimeFigureOut">
               <a:rPr lang="en-SG" smtClean="0"/>
-              <a:t>14/7/2017</a:t>
+              <a:t>29/7/2024</a:t>
             </a:fld>
             <a:endParaRPr lang="en-SG"/>
           </a:p>
@@ -1977,7 +1993,7 @@
           <a:p>
             <a:fld id="{A8886CD7-4058-4E48-B9C4-9EA782D336AA}" type="datetimeFigureOut">
               <a:rPr lang="en-SG" smtClean="0"/>
-              <a:t>14/7/2017</a:t>
+              <a:t>29/7/2024</a:t>
             </a:fld>
             <a:endParaRPr lang="en-SG"/>
           </a:p>
@@ -2080,7 +2096,7 @@
           </a:lstStyle>
           <a:p>
             <a:r>
-              <a:rPr lang="en-US" smtClean="0"/>
+              <a:rPr lang="en-US"/>
               <a:t>Click to edit Master title style</a:t>
             </a:r>
             <a:endParaRPr lang="en-SG"/>
@@ -2137,35 +2153,35 @@
           <a:p>
             <a:pPr lvl="0"/>
             <a:r>
-              <a:rPr lang="en-US" smtClean="0"/>
+              <a:rPr lang="en-US"/>
               <a:t>Click to edit Master text styles</a:t>
             </a:r>
           </a:p>
           <a:p>
             <a:pPr lvl="1"/>
             <a:r>
-              <a:rPr lang="en-US" smtClean="0"/>
+              <a:rPr lang="en-US"/>
               <a:t>Second level</a:t>
             </a:r>
           </a:p>
           <a:p>
             <a:pPr lvl="2"/>
             <a:r>
-              <a:rPr lang="en-US" smtClean="0"/>
+              <a:rPr lang="en-US"/>
               <a:t>Third level</a:t>
             </a:r>
           </a:p>
           <a:p>
             <a:pPr lvl="3"/>
             <a:r>
-              <a:rPr lang="en-US" smtClean="0"/>
+              <a:rPr lang="en-US"/>
               <a:t>Fourth level</a:t>
             </a:r>
           </a:p>
           <a:p>
             <a:pPr lvl="4"/>
             <a:r>
-              <a:rPr lang="en-US" smtClean="0"/>
+              <a:rPr lang="en-US"/>
               <a:t>Fifth level</a:t>
             </a:r>
             <a:endParaRPr lang="en-SG"/>
@@ -2231,7 +2247,7 @@
           <a:p>
             <a:pPr lvl="0"/>
             <a:r>
-              <a:rPr lang="en-US" smtClean="0"/>
+              <a:rPr lang="en-US"/>
               <a:t>Click to edit Master text styles</a:t>
             </a:r>
           </a:p>
@@ -2254,7 +2270,7 @@
           <a:p>
             <a:fld id="{A8886CD7-4058-4E48-B9C4-9EA782D336AA}" type="datetimeFigureOut">
               <a:rPr lang="en-SG" smtClean="0"/>
-              <a:t>14/7/2017</a:t>
+              <a:t>29/7/2024</a:t>
             </a:fld>
             <a:endParaRPr lang="en-SG"/>
           </a:p>
@@ -2357,7 +2373,7 @@
           </a:lstStyle>
           <a:p>
             <a:r>
-              <a:rPr lang="en-US" smtClean="0"/>
+              <a:rPr lang="en-US"/>
               <a:t>Click to edit Master title style</a:t>
             </a:r>
             <a:endParaRPr lang="en-SG"/>
@@ -2484,7 +2500,7 @@
           <a:p>
             <a:pPr lvl="0"/>
             <a:r>
-              <a:rPr lang="en-US" smtClean="0"/>
+              <a:rPr lang="en-US"/>
               <a:t>Click to edit Master text styles</a:t>
             </a:r>
           </a:p>
@@ -2507,7 +2523,7 @@
           <a:p>
             <a:fld id="{A8886CD7-4058-4E48-B9C4-9EA782D336AA}" type="datetimeFigureOut">
               <a:rPr lang="en-SG" smtClean="0"/>
-              <a:t>14/7/2017</a:t>
+              <a:t>29/7/2024</a:t>
             </a:fld>
             <a:endParaRPr lang="en-SG"/>
           </a:p>
@@ -2616,7 +2632,7 @@
           <a:lstStyle/>
           <a:p>
             <a:r>
-              <a:rPr lang="en-US" smtClean="0"/>
+              <a:rPr lang="en-US"/>
               <a:t>Click to edit Master title style</a:t>
             </a:r>
             <a:endParaRPr lang="en-SG"/>
@@ -2650,35 +2666,35 @@
           <a:p>
             <a:pPr lvl="0"/>
             <a:r>
-              <a:rPr lang="en-US" smtClean="0"/>
+              <a:rPr lang="en-US"/>
               <a:t>Click to edit Master text styles</a:t>
             </a:r>
           </a:p>
           <a:p>
             <a:pPr lvl="1"/>
             <a:r>
-              <a:rPr lang="en-US" smtClean="0"/>
+              <a:rPr lang="en-US"/>
               <a:t>Second level</a:t>
             </a:r>
           </a:p>
           <a:p>
             <a:pPr lvl="2"/>
             <a:r>
-              <a:rPr lang="en-US" smtClean="0"/>
+              <a:rPr lang="en-US"/>
               <a:t>Third level</a:t>
             </a:r>
           </a:p>
           <a:p>
             <a:pPr lvl="3"/>
             <a:r>
-              <a:rPr lang="en-US" smtClean="0"/>
+              <a:rPr lang="en-US"/>
               <a:t>Fourth level</a:t>
             </a:r>
           </a:p>
           <a:p>
             <a:pPr lvl="4"/>
             <a:r>
-              <a:rPr lang="en-US" smtClean="0"/>
+              <a:rPr lang="en-US"/>
               <a:t>Fifth level</a:t>
             </a:r>
             <a:endParaRPr lang="en-SG"/>
@@ -2720,7 +2736,7 @@
           <a:p>
             <a:fld id="{A8886CD7-4058-4E48-B9C4-9EA782D336AA}" type="datetimeFigureOut">
               <a:rPr lang="en-SG" smtClean="0"/>
-              <a:t>14/7/2017</a:t>
+              <a:t>29/7/2024</a:t>
             </a:fld>
             <a:endParaRPr lang="en-SG"/>
           </a:p>
@@ -3104,14 +3120,22 @@
           <p:nvPr/>
         </p:nvPicPr>
         <p:blipFill>
-          <a:blip r:embed="rId2" cstate="print"/>
+          <a:blip r:embed="rId2" cstate="print">
+            <a:duotone>
+              <a:schemeClr val="bg2">
+                <a:shade val="45000"/>
+                <a:satMod val="135000"/>
+              </a:schemeClr>
+              <a:prstClr val="white"/>
+            </a:duotone>
+          </a:blip>
           <a:stretch>
             <a:fillRect/>
           </a:stretch>
         </p:blipFill>
         <p:spPr>
           <a:xfrm>
-            <a:off x="4174706" y="3661115"/>
+            <a:off x="4011642" y="3881935"/>
             <a:ext cx="1405406" cy="1496077"/>
           </a:xfrm>
           <a:prstGeom prst="rect">
@@ -3127,8 +3151,8 @@
         </p:nvSpPr>
         <p:spPr>
           <a:xfrm>
-            <a:off x="3567678" y="2809394"/>
-            <a:ext cx="1440160" cy="1915413"/>
+            <a:off x="3567678" y="3196885"/>
+            <a:ext cx="1440160" cy="1527922"/>
           </a:xfrm>
           <a:prstGeom prst="can">
             <a:avLst/>
@@ -3248,7 +3272,7 @@
           <a:p>
             <a:pPr algn="ctr"/>
             <a:r>
-              <a:rPr lang="en-US" sz="2800" dirty="0" smtClean="0"/>
+              <a:rPr lang="en-US" dirty="0"/>
               <a:t>Team’s Central Repo</a:t>
             </a:r>
           </a:p>
@@ -3256,14 +3280,14 @@
       </p:sp>
       <p:sp>
         <p:nvSpPr>
-          <p:cNvPr id="6" name="Oval 5"/>
+          <p:cNvPr id="7" name="Oval 6"/>
           <p:cNvSpPr/>
           <p:nvPr/>
         </p:nvSpPr>
         <p:spPr>
           <a:xfrm>
-            <a:off x="308248" y="2254769"/>
-            <a:ext cx="2175520" cy="1488514"/>
+            <a:off x="827583" y="5021177"/>
+            <a:ext cx="1656184" cy="990177"/>
           </a:xfrm>
           <a:prstGeom prst="ellipse">
             <a:avLst/>
@@ -3290,112 +3314,10 @@
         </p:style>
         <p:txBody>
           <a:bodyPr rtlCol="0" anchor="ctr"/>
-          <a:lstStyle>
-            <a:defPPr>
-              <a:defRPr lang="en-US"/>
-            </a:defPPr>
-            <a:lvl1pPr marL="0" algn="l" defTabSz="914400" rtl="0" eaLnBrk="1" latinLnBrk="0" hangingPunct="1">
-              <a:defRPr sz="1800" kern="1200">
-                <a:solidFill>
-                  <a:schemeClr val="lt1"/>
-                </a:solidFill>
-                <a:latin typeface="+mn-lt"/>
-                <a:ea typeface="+mn-ea"/>
-                <a:cs typeface="+mn-cs"/>
-              </a:defRPr>
-            </a:lvl1pPr>
-            <a:lvl2pPr marL="457200" algn="l" defTabSz="914400" rtl="0" eaLnBrk="1" latinLnBrk="0" hangingPunct="1">
-              <a:defRPr sz="1800" kern="1200">
-                <a:solidFill>
-                  <a:schemeClr val="lt1"/>
-                </a:solidFill>
-                <a:latin typeface="+mn-lt"/>
-                <a:ea typeface="+mn-ea"/>
-                <a:cs typeface="+mn-cs"/>
-              </a:defRPr>
-            </a:lvl2pPr>
-            <a:lvl3pPr marL="914400" algn="l" defTabSz="914400" rtl="0" eaLnBrk="1" latinLnBrk="0" hangingPunct="1">
-              <a:defRPr sz="1800" kern="1200">
-                <a:solidFill>
-                  <a:schemeClr val="lt1"/>
-                </a:solidFill>
-                <a:latin typeface="+mn-lt"/>
-                <a:ea typeface="+mn-ea"/>
-                <a:cs typeface="+mn-cs"/>
-              </a:defRPr>
-            </a:lvl3pPr>
-            <a:lvl4pPr marL="1371600" algn="l" defTabSz="914400" rtl="0" eaLnBrk="1" latinLnBrk="0" hangingPunct="1">
-              <a:defRPr sz="1800" kern="1200">
-                <a:solidFill>
-                  <a:schemeClr val="lt1"/>
-                </a:solidFill>
-                <a:latin typeface="+mn-lt"/>
-                <a:ea typeface="+mn-ea"/>
-                <a:cs typeface="+mn-cs"/>
-              </a:defRPr>
-            </a:lvl4pPr>
-            <a:lvl5pPr marL="1828800" algn="l" defTabSz="914400" rtl="0" eaLnBrk="1" latinLnBrk="0" hangingPunct="1">
-              <a:defRPr sz="1800" kern="1200">
-                <a:solidFill>
-                  <a:schemeClr val="lt1"/>
-                </a:solidFill>
-                <a:latin typeface="+mn-lt"/>
-                <a:ea typeface="+mn-ea"/>
-                <a:cs typeface="+mn-cs"/>
-              </a:defRPr>
-            </a:lvl5pPr>
-            <a:lvl6pPr marL="2286000" algn="l" defTabSz="914400" rtl="0" eaLnBrk="1" latinLnBrk="0" hangingPunct="1">
-              <a:defRPr sz="1800" kern="1200">
-                <a:solidFill>
-                  <a:schemeClr val="lt1"/>
-                </a:solidFill>
-                <a:latin typeface="+mn-lt"/>
-                <a:ea typeface="+mn-ea"/>
-                <a:cs typeface="+mn-cs"/>
-              </a:defRPr>
-            </a:lvl6pPr>
-            <a:lvl7pPr marL="2743200" algn="l" defTabSz="914400" rtl="0" eaLnBrk="1" latinLnBrk="0" hangingPunct="1">
-              <a:defRPr sz="1800" kern="1200">
-                <a:solidFill>
-                  <a:schemeClr val="lt1"/>
-                </a:solidFill>
-                <a:latin typeface="+mn-lt"/>
-                <a:ea typeface="+mn-ea"/>
-                <a:cs typeface="+mn-cs"/>
-              </a:defRPr>
-            </a:lvl7pPr>
-            <a:lvl8pPr marL="3200400" algn="l" defTabSz="914400" rtl="0" eaLnBrk="1" latinLnBrk="0" hangingPunct="1">
-              <a:defRPr sz="1800" kern="1200">
-                <a:solidFill>
-                  <a:schemeClr val="lt1"/>
-                </a:solidFill>
-                <a:latin typeface="+mn-lt"/>
-                <a:ea typeface="+mn-ea"/>
-                <a:cs typeface="+mn-cs"/>
-              </a:defRPr>
-            </a:lvl8pPr>
-            <a:lvl9pPr marL="3657600" algn="l" defTabSz="914400" rtl="0" eaLnBrk="1" latinLnBrk="0" hangingPunct="1">
-              <a:defRPr sz="1800" kern="1200">
-                <a:solidFill>
-                  <a:schemeClr val="lt1"/>
-                </a:solidFill>
-                <a:latin typeface="+mn-lt"/>
-                <a:ea typeface="+mn-ea"/>
-                <a:cs typeface="+mn-cs"/>
-              </a:defRPr>
-            </a:lvl9pPr>
-          </a:lstStyle>
+          <a:lstStyle/>
           <a:p>
             <a:pPr algn="ctr"/>
-            <a:r>
-              <a:rPr lang="en-US" sz="2400" dirty="0" smtClean="0">
-                <a:solidFill>
-                  <a:srgbClr val="0070C0"/>
-                </a:solidFill>
-              </a:rPr>
-              <a:t>Team Leader</a:t>
-            </a:r>
-            <a:endParaRPr lang="en-US" sz="2400" dirty="0">
+            <a:endParaRPr lang="en-US" dirty="0">
               <a:solidFill>
                 <a:srgbClr val="0070C0"/>
               </a:solidFill>
@@ -3403,169 +3325,18 @@
           </a:p>
         </p:txBody>
       </p:sp>
-      <p:sp>
-        <p:nvSpPr>
-          <p:cNvPr id="7" name="Oval 6"/>
-          <p:cNvSpPr/>
-          <p:nvPr/>
-        </p:nvSpPr>
-        <p:spPr>
-          <a:xfrm>
-            <a:off x="308248" y="4671071"/>
-            <a:ext cx="2175520" cy="1488514"/>
-          </a:xfrm>
-          <a:prstGeom prst="ellipse">
-            <a:avLst/>
-          </a:prstGeom>
-          <a:noFill/>
-          <a:ln>
-            <a:noFill/>
-          </a:ln>
-          <a:effectLst/>
-        </p:spPr>
-        <p:style>
-          <a:lnRef idx="3">
-            <a:schemeClr val="lt1"/>
-          </a:lnRef>
-          <a:fillRef idx="1">
-            <a:schemeClr val="accent1"/>
-          </a:fillRef>
-          <a:effectRef idx="1">
-            <a:schemeClr val="accent1"/>
-          </a:effectRef>
-          <a:fontRef idx="minor">
-            <a:schemeClr val="lt1"/>
-          </a:fontRef>
-        </p:style>
-        <p:txBody>
-          <a:bodyPr rtlCol="0" anchor="ctr"/>
-          <a:lstStyle/>
-          <a:p>
-            <a:pPr algn="ctr"/>
-            <a:r>
-              <a:rPr lang="en-US" sz="2400" dirty="0">
-                <a:solidFill>
-                  <a:srgbClr val="0070C0"/>
-                </a:solidFill>
-              </a:rPr>
-              <a:t>Member C</a:t>
-            </a:r>
-          </a:p>
-        </p:txBody>
-      </p:sp>
-      <p:sp>
-        <p:nvSpPr>
-          <p:cNvPr id="8" name="Oval 7"/>
-          <p:cNvSpPr/>
-          <p:nvPr/>
-        </p:nvSpPr>
-        <p:spPr>
-          <a:xfrm>
-            <a:off x="6156176" y="2254769"/>
-            <a:ext cx="2175520" cy="1488514"/>
-          </a:xfrm>
-          <a:prstGeom prst="ellipse">
-            <a:avLst/>
-          </a:prstGeom>
-          <a:noFill/>
-          <a:ln>
-            <a:noFill/>
-          </a:ln>
-          <a:effectLst/>
-        </p:spPr>
-        <p:style>
-          <a:lnRef idx="3">
-            <a:schemeClr val="lt1"/>
-          </a:lnRef>
-          <a:fillRef idx="1">
-            <a:schemeClr val="accent1"/>
-          </a:fillRef>
-          <a:effectRef idx="1">
-            <a:schemeClr val="accent1"/>
-          </a:effectRef>
-          <a:fontRef idx="minor">
-            <a:schemeClr val="lt1"/>
-          </a:fontRef>
-        </p:style>
-        <p:txBody>
-          <a:bodyPr rtlCol="0" anchor="ctr"/>
-          <a:lstStyle/>
-          <a:p>
-            <a:pPr algn="ctr"/>
-            <a:r>
-              <a:rPr lang="en-US" sz="2400" dirty="0">
-                <a:solidFill>
-                  <a:srgbClr val="0070C0"/>
-                </a:solidFill>
-              </a:rPr>
-              <a:t>Member A</a:t>
-            </a:r>
-          </a:p>
-        </p:txBody>
-      </p:sp>
-      <p:sp>
-        <p:nvSpPr>
-          <p:cNvPr id="9" name="Oval 8"/>
-          <p:cNvSpPr/>
-          <p:nvPr/>
-        </p:nvSpPr>
-        <p:spPr>
-          <a:xfrm>
-            <a:off x="6156176" y="4671071"/>
-            <a:ext cx="2175520" cy="1488514"/>
-          </a:xfrm>
-          <a:prstGeom prst="ellipse">
-            <a:avLst/>
-          </a:prstGeom>
-          <a:noFill/>
-          <a:ln>
-            <a:noFill/>
-          </a:ln>
-          <a:effectLst/>
-        </p:spPr>
-        <p:style>
-          <a:lnRef idx="3">
-            <a:schemeClr val="lt1"/>
-          </a:lnRef>
-          <a:fillRef idx="1">
-            <a:schemeClr val="accent1"/>
-          </a:fillRef>
-          <a:effectRef idx="1">
-            <a:schemeClr val="accent1"/>
-          </a:effectRef>
-          <a:fontRef idx="minor">
-            <a:schemeClr val="lt1"/>
-          </a:fontRef>
-        </p:style>
-        <p:txBody>
-          <a:bodyPr rtlCol="0" anchor="ctr"/>
-          <a:lstStyle/>
-          <a:p>
-            <a:pPr algn="ctr"/>
-            <a:r>
-              <a:rPr lang="en-US" sz="2400" dirty="0">
-                <a:solidFill>
-                  <a:srgbClr val="0070C0"/>
-                </a:solidFill>
-              </a:rPr>
-              <a:t>Member B</a:t>
-            </a:r>
-          </a:p>
-        </p:txBody>
-      </p:sp>
       <p:cxnSp>
         <p:nvCxnSpPr>
           <p:cNvPr id="10" name="Straight Arrow Connector 9"/>
           <p:cNvCxnSpPr>
-            <a:stCxn id="6" idx="6"/>
-            <a:endCxn id="5" idx="2"/>
+            <a:cxnSpLocks/>
           </p:cNvCxnSpPr>
           <p:nvPr/>
         </p:nvCxnSpPr>
         <p:spPr>
           <a:xfrm>
-            <a:off x="2483768" y="2999026"/>
-            <a:ext cx="1083910" cy="768075"/>
+            <a:off x="2416802" y="3368061"/>
+            <a:ext cx="983078" cy="464539"/>
           </a:xfrm>
           <a:prstGeom prst="straightConnector1">
             <a:avLst/>
@@ -3594,15 +3365,14 @@
         <p:nvCxnSpPr>
           <p:cNvPr id="11" name="Straight Arrow Connector 10"/>
           <p:cNvCxnSpPr>
-            <a:stCxn id="8" idx="2"/>
-            <a:endCxn id="5" idx="4"/>
+            <a:cxnSpLocks/>
           </p:cNvCxnSpPr>
           <p:nvPr/>
         </p:nvCxnSpPr>
         <p:spPr>
           <a:xfrm flipH="1">
-            <a:off x="5007838" y="2999026"/>
-            <a:ext cx="1148338" cy="768075"/>
+            <a:off x="5114096" y="3217335"/>
+            <a:ext cx="1036397" cy="580019"/>
           </a:xfrm>
           <a:prstGeom prst="straightConnector1">
             <a:avLst/>
@@ -3631,15 +3401,14 @@
         <p:nvCxnSpPr>
           <p:cNvPr id="12" name="Straight Arrow Connector 11"/>
           <p:cNvCxnSpPr>
-            <a:stCxn id="7" idx="6"/>
-            <a:endCxn id="5" idx="3"/>
+            <a:cxnSpLocks/>
           </p:cNvCxnSpPr>
           <p:nvPr/>
         </p:nvCxnSpPr>
         <p:spPr>
           <a:xfrm flipV="1">
-            <a:off x="2483768" y="4724807"/>
-            <a:ext cx="1803990" cy="690521"/>
+            <a:off x="2381300" y="4370454"/>
+            <a:ext cx="1045957" cy="450875"/>
           </a:xfrm>
           <a:prstGeom prst="straightConnector1">
             <a:avLst/>
@@ -3668,15 +3437,14 @@
         <p:nvCxnSpPr>
           <p:cNvPr id="13" name="Straight Arrow Connector 12"/>
           <p:cNvCxnSpPr>
-            <a:stCxn id="9" idx="2"/>
-            <a:endCxn id="5" idx="3"/>
+            <a:cxnSpLocks/>
           </p:cNvCxnSpPr>
           <p:nvPr/>
         </p:nvCxnSpPr>
         <p:spPr>
           <a:xfrm flipH="1" flipV="1">
-            <a:off x="4287758" y="4724807"/>
-            <a:ext cx="1868418" cy="690521"/>
+            <a:off x="5053549" y="4330736"/>
+            <a:ext cx="1281053" cy="394071"/>
           </a:xfrm>
           <a:prstGeom prst="straightConnector1">
             <a:avLst/>
@@ -3709,7 +3477,7 @@
         </p:nvSpPr>
         <p:spPr>
           <a:xfrm>
-            <a:off x="1752600" y="1981200"/>
+            <a:off x="1290092" y="2245658"/>
             <a:ext cx="731168" cy="685800"/>
           </a:xfrm>
           <a:prstGeom prst="smileyFace">
@@ -3749,7 +3517,7 @@
         </p:nvSpPr>
         <p:spPr>
           <a:xfrm>
-            <a:off x="1173832" y="4471392"/>
+            <a:off x="1290092" y="4471392"/>
             <a:ext cx="731168" cy="685800"/>
           </a:xfrm>
           <a:prstGeom prst="smileyFace">
@@ -3789,7 +3557,7 @@
         </p:nvSpPr>
         <p:spPr>
           <a:xfrm>
-            <a:off x="6629400" y="1962150"/>
+            <a:off x="6629400" y="2295939"/>
             <a:ext cx="731168" cy="685800"/>
           </a:xfrm>
           <a:prstGeom prst="smileyFace">
@@ -3858,6 +3626,166 @@
           <a:p>
             <a:pPr algn="ctr"/>
             <a:endParaRPr lang="en-US"/>
+          </a:p>
+        </p:txBody>
+      </p:sp>
+      <p:sp>
+        <p:nvSpPr>
+          <p:cNvPr id="33" name="TextBox 32">
+            <a:extLst>
+              <a:ext uri="{FF2B5EF4-FFF2-40B4-BE49-F238E27FC236}">
+                <a16:creationId xmlns:a16="http://schemas.microsoft.com/office/drawing/2014/main" id="{179232B7-F488-3B48-98D8-FF5582D7AB22}"/>
+              </a:ext>
+            </a:extLst>
+          </p:cNvPr>
+          <p:cNvSpPr txBox="1"/>
+          <p:nvPr/>
+        </p:nvSpPr>
+        <p:spPr>
+          <a:xfrm>
+            <a:off x="994232" y="5230662"/>
+            <a:ext cx="1322887" cy="369332"/>
+          </a:xfrm>
+          <a:prstGeom prst="rect">
+            <a:avLst/>
+          </a:prstGeom>
+          <a:noFill/>
+        </p:spPr>
+        <p:txBody>
+          <a:bodyPr wrap="square">
+            <a:spAutoFit/>
+          </a:bodyPr>
+          <a:lstStyle/>
+          <a:p>
+            <a:pPr algn="ctr"/>
+            <a:r>
+              <a:rPr lang="en-US" dirty="0">
+                <a:solidFill>
+                  <a:srgbClr val="0070C0"/>
+                </a:solidFill>
+              </a:rPr>
+              <a:t>Member A</a:t>
+            </a:r>
+          </a:p>
+        </p:txBody>
+      </p:sp>
+      <p:sp>
+        <p:nvSpPr>
+          <p:cNvPr id="34" name="TextBox 33">
+            <a:extLst>
+              <a:ext uri="{FF2B5EF4-FFF2-40B4-BE49-F238E27FC236}">
+                <a16:creationId xmlns:a16="http://schemas.microsoft.com/office/drawing/2014/main" id="{82F58F6E-9237-54AE-537B-F1FD83105929}"/>
+              </a:ext>
+            </a:extLst>
+          </p:cNvPr>
+          <p:cNvSpPr txBox="1"/>
+          <p:nvPr/>
+        </p:nvSpPr>
+        <p:spPr>
+          <a:xfrm>
+            <a:off x="6333540" y="3183395"/>
+            <a:ext cx="1322887" cy="369332"/>
+          </a:xfrm>
+          <a:prstGeom prst="rect">
+            <a:avLst/>
+          </a:prstGeom>
+          <a:noFill/>
+        </p:spPr>
+        <p:txBody>
+          <a:bodyPr wrap="square">
+            <a:spAutoFit/>
+          </a:bodyPr>
+          <a:lstStyle/>
+          <a:p>
+            <a:pPr algn="ctr"/>
+            <a:r>
+              <a:rPr lang="en-US" dirty="0">
+                <a:solidFill>
+                  <a:srgbClr val="0070C0"/>
+                </a:solidFill>
+              </a:rPr>
+              <a:t>Member B</a:t>
+            </a:r>
+          </a:p>
+        </p:txBody>
+      </p:sp>
+      <p:sp>
+        <p:nvSpPr>
+          <p:cNvPr id="35" name="TextBox 34">
+            <a:extLst>
+              <a:ext uri="{FF2B5EF4-FFF2-40B4-BE49-F238E27FC236}">
+                <a16:creationId xmlns:a16="http://schemas.microsoft.com/office/drawing/2014/main" id="{61838145-44DD-DD75-DAD3-81716E99AE01}"/>
+              </a:ext>
+            </a:extLst>
+          </p:cNvPr>
+          <p:cNvSpPr txBox="1"/>
+          <p:nvPr/>
+        </p:nvSpPr>
+        <p:spPr>
+          <a:xfrm>
+            <a:off x="6333540" y="5163232"/>
+            <a:ext cx="1322887" cy="369332"/>
+          </a:xfrm>
+          <a:prstGeom prst="rect">
+            <a:avLst/>
+          </a:prstGeom>
+          <a:noFill/>
+        </p:spPr>
+        <p:txBody>
+          <a:bodyPr wrap="square">
+            <a:spAutoFit/>
+          </a:bodyPr>
+          <a:lstStyle/>
+          <a:p>
+            <a:pPr algn="ctr"/>
+            <a:r>
+              <a:rPr lang="en-US" dirty="0">
+                <a:solidFill>
+                  <a:srgbClr val="0070C0"/>
+                </a:solidFill>
+              </a:rPr>
+              <a:t>Member C</a:t>
+            </a:r>
+          </a:p>
+        </p:txBody>
+      </p:sp>
+      <p:sp>
+        <p:nvSpPr>
+          <p:cNvPr id="36" name="TextBox 35">
+            <a:extLst>
+              <a:ext uri="{FF2B5EF4-FFF2-40B4-BE49-F238E27FC236}">
+                <a16:creationId xmlns:a16="http://schemas.microsoft.com/office/drawing/2014/main" id="{C4771953-AF78-2338-68E9-0543F626DEA0}"/>
+              </a:ext>
+            </a:extLst>
+          </p:cNvPr>
+          <p:cNvSpPr txBox="1"/>
+          <p:nvPr/>
+        </p:nvSpPr>
+        <p:spPr>
+          <a:xfrm>
+            <a:off x="1002391" y="3059668"/>
+            <a:ext cx="1322887" cy="369332"/>
+          </a:xfrm>
+          <a:prstGeom prst="rect">
+            <a:avLst/>
+          </a:prstGeom>
+          <a:noFill/>
+        </p:spPr>
+        <p:txBody>
+          <a:bodyPr wrap="square">
+            <a:spAutoFit/>
+          </a:bodyPr>
+          <a:lstStyle/>
+          <a:p>
+            <a:pPr algn="ctr"/>
+            <a:r>
+              <a:rPr lang="en-US" dirty="0">
+                <a:solidFill>
+                  <a:srgbClr val="0070C0"/>
+                </a:solidFill>
+              </a:rPr>
+              <a:t>Team lead</a:t>
+            </a:r>
           </a:p>
         </p:txBody>
       </p:sp>

</xml_diff>